<commit_message>
Fixes and name changes
</commit_message>
<xml_diff>
--- a/SWE507-Project3/Project3-Lena.pptx
+++ b/SWE507-Project3/Project3-Lena.pptx
@@ -219,6 +219,7 @@
             <c:showLeaderLines val="0"/>
             <c:extLst>
               <c:ext xmlns:c15="http://schemas.microsoft.com/office/drawing/2012/chart" uri="{CE6537A1-D6FC-4f65-9D91-7224C49458BB}">
+                <c15:layout/>
                 <c15:showLeaderLines val="1"/>
                 <c15:leaderLines>
                   <c:spPr>
@@ -584,6 +585,7 @@
             <c:showLeaderLines val="0"/>
             <c:extLst>
               <c:ext xmlns:c15="http://schemas.microsoft.com/office/drawing/2012/chart" uri="{CE6537A1-D6FC-4f65-9D91-7224C49458BB}">
+                <c15:layout/>
                 <c15:showLeaderLines val="1"/>
                 <c15:leaderLines>
                   <c:spPr>
@@ -1019,157 +1021,6 @@
           <c:extLst>
             <c:ext xmlns:c16="http://schemas.microsoft.com/office/drawing/2014/chart" uri="{C3380CC4-5D6E-409C-BE32-E72D297353CC}">
               <c16:uniqueId val="{00000000-9BA0-4961-98AD-9448B3D25D62}"/>
-            </c:ext>
-          </c:extLst>
-        </c:ser>
-        <c:ser>
-          <c:idx val="1"/>
-          <c:order val="1"/>
-          <c:tx>
-            <c:strRef>
-              <c:f>Sayfa1!$C$1</c:f>
-              <c:strCache>
-                <c:ptCount val="1"/>
-                <c:pt idx="0">
-                  <c:v> for collapse(2)</c:v>
-                </c:pt>
-              </c:strCache>
-            </c:strRef>
-          </c:tx>
-          <c:spPr>
-            <a:ln w="28575" cap="rnd">
-              <a:solidFill>
-                <a:schemeClr val="accent2"/>
-              </a:solidFill>
-              <a:round/>
-            </a:ln>
-            <a:effectLst/>
-          </c:spPr>
-          <c:marker>
-            <c:symbol val="circle"/>
-            <c:size val="5"/>
-            <c:spPr>
-              <a:solidFill>
-                <a:schemeClr val="accent2"/>
-              </a:solidFill>
-              <a:ln w="9525">
-                <a:solidFill>
-                  <a:schemeClr val="accent2"/>
-                </a:solidFill>
-              </a:ln>
-              <a:effectLst/>
-            </c:spPr>
-          </c:marker>
-          <c:dLbls>
-            <c:spPr>
-              <a:noFill/>
-              <a:ln>
-                <a:noFill/>
-              </a:ln>
-              <a:effectLst/>
-            </c:spPr>
-            <c:txPr>
-              <a:bodyPr rot="0" spcFirstLastPara="1" vertOverflow="ellipsis" vert="horz" wrap="square" lIns="38100" tIns="19050" rIns="38100" bIns="19050" anchor="ctr" anchorCtr="1">
-                <a:spAutoFit/>
-              </a:bodyPr>
-              <a:lstStyle/>
-              <a:p>
-                <a:pPr>
-                  <a:defRPr sz="1197" b="0" i="0" u="none" strike="noStrike" kern="1200" baseline="0">
-                    <a:solidFill>
-                      <a:schemeClr val="tx1">
-                        <a:lumMod val="75000"/>
-                        <a:lumOff val="25000"/>
-                      </a:schemeClr>
-                    </a:solidFill>
-                    <a:latin typeface="+mn-lt"/>
-                    <a:ea typeface="+mn-ea"/>
-                    <a:cs typeface="+mn-cs"/>
-                  </a:defRPr>
-                </a:pPr>
-                <a:endParaRPr lang="tr-TR"/>
-              </a:p>
-            </c:txPr>
-            <c:dLblPos val="t"/>
-            <c:showLegendKey val="0"/>
-            <c:showVal val="1"/>
-            <c:showCatName val="0"/>
-            <c:showSerName val="0"/>
-            <c:showPercent val="0"/>
-            <c:showBubbleSize val="0"/>
-            <c:showLeaderLines val="0"/>
-            <c:extLst>
-              <c:ext xmlns:c15="http://schemas.microsoft.com/office/drawing/2012/chart" uri="{CE6537A1-D6FC-4f65-9D91-7224C49458BB}">
-                <c15:layout/>
-                <c15:showLeaderLines val="1"/>
-                <c15:leaderLines>
-                  <c:spPr>
-                    <a:ln w="9525" cap="flat" cmpd="sng" algn="ctr">
-                      <a:solidFill>
-                        <a:schemeClr val="tx1">
-                          <a:lumMod val="35000"/>
-                          <a:lumOff val="65000"/>
-                        </a:schemeClr>
-                      </a:solidFill>
-                      <a:round/>
-                    </a:ln>
-                    <a:effectLst/>
-                  </c:spPr>
-                </c15:leaderLines>
-              </c:ext>
-            </c:extLst>
-          </c:dLbls>
-          <c:cat>
-            <c:strRef>
-              <c:f>Sayfa1!$A$2:$A$6</c:f>
-              <c:strCache>
-                <c:ptCount val="5"/>
-                <c:pt idx="0">
-                  <c:v>1 Thread</c:v>
-                </c:pt>
-                <c:pt idx="1">
-                  <c:v>3 Thread</c:v>
-                </c:pt>
-                <c:pt idx="2">
-                  <c:v>6 Thread</c:v>
-                </c:pt>
-                <c:pt idx="3">
-                  <c:v>9 Thread</c:v>
-                </c:pt>
-                <c:pt idx="4">
-                  <c:v>12 Thread</c:v>
-                </c:pt>
-              </c:strCache>
-            </c:strRef>
-          </c:cat>
-          <c:val>
-            <c:numRef>
-              <c:f>Sayfa1!$C$2:$C$6</c:f>
-              <c:numCache>
-                <c:formatCode>General</c:formatCode>
-                <c:ptCount val="5"/>
-                <c:pt idx="0">
-                  <c:v>8.1779999999999995E-3</c:v>
-                </c:pt>
-                <c:pt idx="1">
-                  <c:v>3.0999999999999999E-3</c:v>
-                </c:pt>
-                <c:pt idx="2">
-                  <c:v>3.1779999999999998E-3</c:v>
-                </c:pt>
-                <c:pt idx="3">
-                  <c:v>2.5739999999999999E-3</c:v>
-                </c:pt>
-                <c:pt idx="4">
-                  <c:v>3.202E-3</c:v>
-                </c:pt>
-              </c:numCache>
-            </c:numRef>
-          </c:val>
-          <c:smooth val="0"/>
-          <c:extLst>
-            <c:ext xmlns:c16="http://schemas.microsoft.com/office/drawing/2014/chart" uri="{C3380CC4-5D6E-409C-BE32-E72D297353CC}">
-              <c16:uniqueId val="{00000001-CE7A-4F08-813D-CF0775EB1822}"/>
             </c:ext>
           </c:extLst>
         </c:ser>
@@ -3079,7 +2930,7 @@
           <a:p>
             <a:fld id="{A6A6DAFA-B29C-4D69-8320-55DB4F2C1632}" type="datetimeFigureOut">
               <a:rPr lang="tr-TR" smtClean="0"/>
-              <a:t>4.04.2025</a:t>
+              <a:t>11.04.2025</a:t>
             </a:fld>
             <a:endParaRPr lang="tr-TR" dirty="0"/>
           </a:p>
@@ -3488,7 +3339,7 @@
           <a:noFill/>
           <a:extLst>
             <a:ext uri="{909E8E84-426E-40dd-AFC4-6F175D3DCCD1}">
-              <a14:hiddenFill xmlns:a14="http://schemas.microsoft.com/office/drawing/2010/main" xmlns="">
+              <a14:hiddenFill xmlns="" xmlns:a14="http://schemas.microsoft.com/office/drawing/2010/main">
                 <a:solidFill>
                   <a:srgbClr val="FFFFFF"/>
                 </a:solidFill>
@@ -3547,7 +3398,7 @@
             </a:ln>
             <a:extLst>
               <a:ext uri="{91240B29-F687-4f45-9708-019B960494DF}">
-                <a14:hiddenLine xmlns:a14="http://schemas.microsoft.com/office/drawing/2010/main" xmlns="" w="9525">
+                <a14:hiddenLine xmlns="" xmlns:a14="http://schemas.microsoft.com/office/drawing/2010/main" w="9525">
                   <a:solidFill>
                     <a:srgbClr val="000000"/>
                   </a:solidFill>
@@ -3637,7 +3488,7 @@
             </a:ln>
             <a:extLst>
               <a:ext uri="{91240B29-F687-4f45-9708-019B960494DF}">
-                <a14:hiddenLine xmlns:a14="http://schemas.microsoft.com/office/drawing/2010/main" xmlns="" w="9525">
+                <a14:hiddenLine xmlns="" xmlns:a14="http://schemas.microsoft.com/office/drawing/2010/main" w="9525">
                   <a:solidFill>
                     <a:srgbClr val="000000"/>
                   </a:solidFill>
@@ -3727,7 +3578,7 @@
             </a:ln>
             <a:extLst>
               <a:ext uri="{91240B29-F687-4f45-9708-019B960494DF}">
-                <a14:hiddenLine xmlns:a14="http://schemas.microsoft.com/office/drawing/2010/main" xmlns="" w="9525">
+                <a14:hiddenLine xmlns="" xmlns:a14="http://schemas.microsoft.com/office/drawing/2010/main" w="9525">
                   <a:solidFill>
                     <a:srgbClr val="000000"/>
                   </a:solidFill>
@@ -3761,7 +3612,7 @@
             </a:ln>
             <a:extLst>
               <a:ext uri="{91240B29-F687-4f45-9708-019B960494DF}">
-                <a14:hiddenLine xmlns:a14="http://schemas.microsoft.com/office/drawing/2010/main" xmlns="" w="9525">
+                <a14:hiddenLine xmlns="" xmlns:a14="http://schemas.microsoft.com/office/drawing/2010/main" w="9525">
                   <a:solidFill>
                     <a:srgbClr val="000000"/>
                   </a:solidFill>
@@ -3851,7 +3702,7 @@
             </a:ln>
             <a:extLst>
               <a:ext uri="{91240B29-F687-4f45-9708-019B960494DF}">
-                <a14:hiddenLine xmlns:a14="http://schemas.microsoft.com/office/drawing/2010/main" xmlns="" w="9525">
+                <a14:hiddenLine xmlns="" xmlns:a14="http://schemas.microsoft.com/office/drawing/2010/main" w="9525">
                   <a:solidFill>
                     <a:srgbClr val="000000"/>
                   </a:solidFill>
@@ -3913,7 +3764,7 @@
             </a:ln>
             <a:extLst>
               <a:ext uri="{91240B29-F687-4f45-9708-019B960494DF}">
-                <a14:hiddenLine xmlns:a14="http://schemas.microsoft.com/office/drawing/2010/main" xmlns="" w="9525">
+                <a14:hiddenLine xmlns="" xmlns:a14="http://schemas.microsoft.com/office/drawing/2010/main" w="9525">
                   <a:solidFill>
                     <a:srgbClr val="000000"/>
                   </a:solidFill>
@@ -3975,7 +3826,7 @@
             </a:ln>
             <a:extLst>
               <a:ext uri="{91240B29-F687-4f45-9708-019B960494DF}">
-                <a14:hiddenLine xmlns:a14="http://schemas.microsoft.com/office/drawing/2010/main" xmlns="" w="9525">
+                <a14:hiddenLine xmlns="" xmlns:a14="http://schemas.microsoft.com/office/drawing/2010/main" w="9525">
                   <a:solidFill>
                     <a:srgbClr val="000000"/>
                   </a:solidFill>
@@ -4065,7 +3916,7 @@
             </a:ln>
             <a:extLst>
               <a:ext uri="{91240B29-F687-4f45-9708-019B960494DF}">
-                <a14:hiddenLine xmlns:a14="http://schemas.microsoft.com/office/drawing/2010/main" xmlns="" w="9525">
+                <a14:hiddenLine xmlns="" xmlns:a14="http://schemas.microsoft.com/office/drawing/2010/main" w="9525">
                   <a:solidFill>
                     <a:srgbClr val="000000"/>
                   </a:solidFill>
@@ -4127,7 +3978,7 @@
             </a:ln>
             <a:extLst>
               <a:ext uri="{91240B29-F687-4f45-9708-019B960494DF}">
-                <a14:hiddenLine xmlns:a14="http://schemas.microsoft.com/office/drawing/2010/main" xmlns="" w="9525">
+                <a14:hiddenLine xmlns="" xmlns:a14="http://schemas.microsoft.com/office/drawing/2010/main" w="9525">
                   <a:solidFill>
                     <a:srgbClr val="000000"/>
                   </a:solidFill>
@@ -4189,7 +4040,7 @@
             </a:ln>
             <a:extLst>
               <a:ext uri="{91240B29-F687-4f45-9708-019B960494DF}">
-                <a14:hiddenLine xmlns:a14="http://schemas.microsoft.com/office/drawing/2010/main" xmlns="" w="9525">
+                <a14:hiddenLine xmlns="" xmlns:a14="http://schemas.microsoft.com/office/drawing/2010/main" w="9525">
                   <a:solidFill>
                     <a:srgbClr val="000000"/>
                   </a:solidFill>
@@ -4279,7 +4130,7 @@
             </a:ln>
             <a:extLst>
               <a:ext uri="{91240B29-F687-4f45-9708-019B960494DF}">
-                <a14:hiddenLine xmlns:a14="http://schemas.microsoft.com/office/drawing/2010/main" xmlns="" w="9525">
+                <a14:hiddenLine xmlns="" xmlns:a14="http://schemas.microsoft.com/office/drawing/2010/main" w="9525">
                   <a:solidFill>
                     <a:srgbClr val="000000"/>
                   </a:solidFill>
@@ -4369,7 +4220,7 @@
             </a:ln>
             <a:extLst>
               <a:ext uri="{91240B29-F687-4f45-9708-019B960494DF}">
-                <a14:hiddenLine xmlns:a14="http://schemas.microsoft.com/office/drawing/2010/main" xmlns="" w="9525">
+                <a14:hiddenLine xmlns="" xmlns:a14="http://schemas.microsoft.com/office/drawing/2010/main" w="9525">
                   <a:solidFill>
                     <a:srgbClr val="000000"/>
                   </a:solidFill>
@@ -4431,7 +4282,7 @@
             </a:ln>
             <a:extLst>
               <a:ext uri="{91240B29-F687-4f45-9708-019B960494DF}">
-                <a14:hiddenLine xmlns:a14="http://schemas.microsoft.com/office/drawing/2010/main" xmlns="" w="9525">
+                <a14:hiddenLine xmlns="" xmlns:a14="http://schemas.microsoft.com/office/drawing/2010/main" w="9525">
                   <a:solidFill>
                     <a:srgbClr val="000000"/>
                   </a:solidFill>
@@ -4541,7 +4392,7 @@
             </a:ln>
             <a:extLst>
               <a:ext uri="{91240B29-F687-4f45-9708-019B960494DF}">
-                <a14:hiddenLine xmlns:a14="http://schemas.microsoft.com/office/drawing/2010/main" xmlns="" w="9525">
+                <a14:hiddenLine xmlns="" xmlns:a14="http://schemas.microsoft.com/office/drawing/2010/main" w="9525">
                   <a:solidFill>
                     <a:srgbClr val="000000"/>
                   </a:solidFill>
@@ -4603,7 +4454,7 @@
             </a:ln>
             <a:extLst>
               <a:ext uri="{91240B29-F687-4f45-9708-019B960494DF}">
-                <a14:hiddenLine xmlns:a14="http://schemas.microsoft.com/office/drawing/2010/main" xmlns="" w="9525">
+                <a14:hiddenLine xmlns="" xmlns:a14="http://schemas.microsoft.com/office/drawing/2010/main" w="9525">
                   <a:solidFill>
                     <a:srgbClr val="000000"/>
                   </a:solidFill>
@@ -4693,7 +4544,7 @@
             </a:ln>
             <a:extLst>
               <a:ext uri="{91240B29-F687-4f45-9708-019B960494DF}">
-                <a14:hiddenLine xmlns:a14="http://schemas.microsoft.com/office/drawing/2010/main" xmlns="" w="9525">
+                <a14:hiddenLine xmlns="" xmlns:a14="http://schemas.microsoft.com/office/drawing/2010/main" w="9525">
                   <a:solidFill>
                     <a:srgbClr val="000000"/>
                   </a:solidFill>
@@ -4783,7 +4634,7 @@
             </a:ln>
             <a:extLst>
               <a:ext uri="{91240B29-F687-4f45-9708-019B960494DF}">
-                <a14:hiddenLine xmlns:a14="http://schemas.microsoft.com/office/drawing/2010/main" xmlns="" w="9525">
+                <a14:hiddenLine xmlns="" xmlns:a14="http://schemas.microsoft.com/office/drawing/2010/main" w="9525">
                   <a:solidFill>
                     <a:srgbClr val="000000"/>
                   </a:solidFill>
@@ -4845,7 +4696,7 @@
             </a:ln>
             <a:extLst>
               <a:ext uri="{91240B29-F687-4f45-9708-019B960494DF}">
-                <a14:hiddenLine xmlns:a14="http://schemas.microsoft.com/office/drawing/2010/main" xmlns="" w="9525">
+                <a14:hiddenLine xmlns="" xmlns:a14="http://schemas.microsoft.com/office/drawing/2010/main" w="9525">
                   <a:solidFill>
                     <a:srgbClr val="000000"/>
                   </a:solidFill>
@@ -4935,7 +4786,7 @@
             </a:ln>
             <a:extLst>
               <a:ext uri="{91240B29-F687-4f45-9708-019B960494DF}">
-                <a14:hiddenLine xmlns:a14="http://schemas.microsoft.com/office/drawing/2010/main" xmlns="" w="9525">
+                <a14:hiddenLine xmlns="" xmlns:a14="http://schemas.microsoft.com/office/drawing/2010/main" w="9525">
                   <a:solidFill>
                     <a:srgbClr val="000000"/>
                   </a:solidFill>
@@ -5025,7 +4876,7 @@
             </a:ln>
             <a:extLst>
               <a:ext uri="{91240B29-F687-4f45-9708-019B960494DF}">
-                <a14:hiddenLine xmlns:a14="http://schemas.microsoft.com/office/drawing/2010/main" xmlns="" w="9525">
+                <a14:hiddenLine xmlns="" xmlns:a14="http://schemas.microsoft.com/office/drawing/2010/main" w="9525">
                   <a:solidFill>
                     <a:srgbClr val="000000"/>
                   </a:solidFill>
@@ -5081,7 +4932,7 @@
             </a:ln>
             <a:extLst>
               <a:ext uri="{91240B29-F687-4f45-9708-019B960494DF}">
-                <a14:hiddenLine xmlns:a14="http://schemas.microsoft.com/office/drawing/2010/main" xmlns="" w="9525">
+                <a14:hiddenLine xmlns="" xmlns:a14="http://schemas.microsoft.com/office/drawing/2010/main" w="9525">
                   <a:solidFill>
                     <a:srgbClr val="000000"/>
                   </a:solidFill>
@@ -5171,7 +5022,7 @@
             </a:ln>
             <a:extLst>
               <a:ext uri="{91240B29-F687-4f45-9708-019B960494DF}">
-                <a14:hiddenLine xmlns:a14="http://schemas.microsoft.com/office/drawing/2010/main" xmlns="" w="9525">
+                <a14:hiddenLine xmlns="" xmlns:a14="http://schemas.microsoft.com/office/drawing/2010/main" w="9525">
                   <a:solidFill>
                     <a:srgbClr val="000000"/>
                   </a:solidFill>
@@ -5227,7 +5078,7 @@
             </a:ln>
             <a:extLst>
               <a:ext uri="{91240B29-F687-4f45-9708-019B960494DF}">
-                <a14:hiddenLine xmlns:a14="http://schemas.microsoft.com/office/drawing/2010/main" xmlns="" w="9525">
+                <a14:hiddenLine xmlns="" xmlns:a14="http://schemas.microsoft.com/office/drawing/2010/main" w="9525">
                   <a:solidFill>
                     <a:srgbClr val="000000"/>
                   </a:solidFill>
@@ -5317,7 +5168,7 @@
             </a:ln>
             <a:extLst>
               <a:ext uri="{91240B29-F687-4f45-9708-019B960494DF}">
-                <a14:hiddenLine xmlns:a14="http://schemas.microsoft.com/office/drawing/2010/main" xmlns="" w="9525">
+                <a14:hiddenLine xmlns="" xmlns:a14="http://schemas.microsoft.com/office/drawing/2010/main" w="9525">
                   <a:solidFill>
                     <a:srgbClr val="000000"/>
                   </a:solidFill>
@@ -5385,7 +5236,7 @@
             </a:ln>
             <a:extLst>
               <a:ext uri="{91240B29-F687-4f45-9708-019B960494DF}">
-                <a14:hiddenLine xmlns:a14="http://schemas.microsoft.com/office/drawing/2010/main" xmlns="" w="9525">
+                <a14:hiddenLine xmlns="" xmlns:a14="http://schemas.microsoft.com/office/drawing/2010/main" w="9525">
                   <a:solidFill>
                     <a:srgbClr val="000000"/>
                   </a:solidFill>
@@ -5475,7 +5326,7 @@
             </a:ln>
             <a:extLst>
               <a:ext uri="{91240B29-F687-4f45-9708-019B960494DF}">
-                <a14:hiddenLine xmlns:a14="http://schemas.microsoft.com/office/drawing/2010/main" xmlns="" w="9525">
+                <a14:hiddenLine xmlns="" xmlns:a14="http://schemas.microsoft.com/office/drawing/2010/main" w="9525">
                   <a:solidFill>
                     <a:srgbClr val="000000"/>
                   </a:solidFill>
@@ -5543,7 +5394,7 @@
             </a:ln>
             <a:extLst>
               <a:ext uri="{91240B29-F687-4f45-9708-019B960494DF}">
-                <a14:hiddenLine xmlns:a14="http://schemas.microsoft.com/office/drawing/2010/main" xmlns="" w="9525">
+                <a14:hiddenLine xmlns="" xmlns:a14="http://schemas.microsoft.com/office/drawing/2010/main" w="9525">
                   <a:solidFill>
                     <a:srgbClr val="000000"/>
                   </a:solidFill>
@@ -5633,7 +5484,7 @@
             </a:ln>
             <a:extLst>
               <a:ext uri="{91240B29-F687-4f45-9708-019B960494DF}">
-                <a14:hiddenLine xmlns:a14="http://schemas.microsoft.com/office/drawing/2010/main" xmlns="" w="9525">
+                <a14:hiddenLine xmlns="" xmlns:a14="http://schemas.microsoft.com/office/drawing/2010/main" w="9525">
                   <a:solidFill>
                     <a:srgbClr val="000000"/>
                   </a:solidFill>
@@ -5667,7 +5518,7 @@
             </a:ln>
             <a:extLst>
               <a:ext uri="{91240B29-F687-4f45-9708-019B960494DF}">
-                <a14:hiddenLine xmlns:a14="http://schemas.microsoft.com/office/drawing/2010/main" xmlns="" w="9525">
+                <a14:hiddenLine xmlns="" xmlns:a14="http://schemas.microsoft.com/office/drawing/2010/main" w="9525">
                   <a:solidFill>
                     <a:srgbClr val="000000"/>
                   </a:solidFill>
@@ -5757,7 +5608,7 @@
             </a:ln>
             <a:extLst>
               <a:ext uri="{91240B29-F687-4f45-9708-019B960494DF}">
-                <a14:hiddenLine xmlns:a14="http://schemas.microsoft.com/office/drawing/2010/main" xmlns="" w="9525">
+                <a14:hiddenLine xmlns="" xmlns:a14="http://schemas.microsoft.com/office/drawing/2010/main" w="9525">
                   <a:solidFill>
                     <a:srgbClr val="000000"/>
                   </a:solidFill>
@@ -5819,7 +5670,7 @@
             </a:ln>
             <a:extLst>
               <a:ext uri="{91240B29-F687-4f45-9708-019B960494DF}">
-                <a14:hiddenLine xmlns:a14="http://schemas.microsoft.com/office/drawing/2010/main" xmlns="" w="9525">
+                <a14:hiddenLine xmlns="" xmlns:a14="http://schemas.microsoft.com/office/drawing/2010/main" w="9525">
                   <a:solidFill>
                     <a:srgbClr val="000000"/>
                   </a:solidFill>
@@ -5881,7 +5732,7 @@
             </a:ln>
             <a:extLst>
               <a:ext uri="{91240B29-F687-4f45-9708-019B960494DF}">
-                <a14:hiddenLine xmlns:a14="http://schemas.microsoft.com/office/drawing/2010/main" xmlns="" w="9525">
+                <a14:hiddenLine xmlns="" xmlns:a14="http://schemas.microsoft.com/office/drawing/2010/main" w="9525">
                   <a:solidFill>
                     <a:srgbClr val="000000"/>
                   </a:solidFill>
@@ -5971,7 +5822,7 @@
             </a:ln>
             <a:extLst>
               <a:ext uri="{91240B29-F687-4f45-9708-019B960494DF}">
-                <a14:hiddenLine xmlns:a14="http://schemas.microsoft.com/office/drawing/2010/main" xmlns="" w="9525">
+                <a14:hiddenLine xmlns="" xmlns:a14="http://schemas.microsoft.com/office/drawing/2010/main" w="9525">
                   <a:solidFill>
                     <a:srgbClr val="000000"/>
                   </a:solidFill>
@@ -6039,7 +5890,7 @@
             </a:ln>
             <a:extLst>
               <a:ext uri="{91240B29-F687-4f45-9708-019B960494DF}">
-                <a14:hiddenLine xmlns:a14="http://schemas.microsoft.com/office/drawing/2010/main" xmlns="" w="9525">
+                <a14:hiddenLine xmlns="" xmlns:a14="http://schemas.microsoft.com/office/drawing/2010/main" w="9525">
                   <a:solidFill>
                     <a:srgbClr val="000000"/>
                   </a:solidFill>
@@ -6101,7 +5952,7 @@
             </a:ln>
             <a:extLst>
               <a:ext uri="{91240B29-F687-4f45-9708-019B960494DF}">
-                <a14:hiddenLine xmlns:a14="http://schemas.microsoft.com/office/drawing/2010/main" xmlns="" w="9525">
+                <a14:hiddenLine xmlns="" xmlns:a14="http://schemas.microsoft.com/office/drawing/2010/main" w="9525">
                   <a:solidFill>
                     <a:srgbClr val="000000"/>
                   </a:solidFill>
@@ -6191,7 +6042,7 @@
             </a:ln>
             <a:extLst>
               <a:ext uri="{91240B29-F687-4f45-9708-019B960494DF}">
-                <a14:hiddenLine xmlns:a14="http://schemas.microsoft.com/office/drawing/2010/main" xmlns="" w="9525">
+                <a14:hiddenLine xmlns="" xmlns:a14="http://schemas.microsoft.com/office/drawing/2010/main" w="9525">
                   <a:solidFill>
                     <a:srgbClr val="000000"/>
                   </a:solidFill>
@@ -6253,7 +6104,7 @@
             </a:ln>
             <a:extLst>
               <a:ext uri="{91240B29-F687-4f45-9708-019B960494DF}">
-                <a14:hiddenLine xmlns:a14="http://schemas.microsoft.com/office/drawing/2010/main" xmlns="" w="9525">
+                <a14:hiddenLine xmlns="" xmlns:a14="http://schemas.microsoft.com/office/drawing/2010/main" w="9525">
                   <a:solidFill>
                     <a:srgbClr val="000000"/>
                   </a:solidFill>
@@ -6343,7 +6194,7 @@
             </a:ln>
             <a:extLst>
               <a:ext uri="{91240B29-F687-4f45-9708-019B960494DF}">
-                <a14:hiddenLine xmlns:a14="http://schemas.microsoft.com/office/drawing/2010/main" xmlns="" w="9525">
+                <a14:hiddenLine xmlns="" xmlns:a14="http://schemas.microsoft.com/office/drawing/2010/main" w="9525">
                   <a:solidFill>
                     <a:srgbClr val="000000"/>
                   </a:solidFill>
@@ -6405,7 +6256,7 @@
             </a:ln>
             <a:extLst>
               <a:ext uri="{91240B29-F687-4f45-9708-019B960494DF}">
-                <a14:hiddenLine xmlns:a14="http://schemas.microsoft.com/office/drawing/2010/main" xmlns="" w="9525">
+                <a14:hiddenLine xmlns="" xmlns:a14="http://schemas.microsoft.com/office/drawing/2010/main" w="9525">
                   <a:solidFill>
                     <a:srgbClr val="000000"/>
                   </a:solidFill>
@@ -6495,7 +6346,7 @@
             </a:ln>
             <a:extLst>
               <a:ext uri="{91240B29-F687-4f45-9708-019B960494DF}">
-                <a14:hiddenLine xmlns:a14="http://schemas.microsoft.com/office/drawing/2010/main" xmlns="" w="9525">
+                <a14:hiddenLine xmlns="" xmlns:a14="http://schemas.microsoft.com/office/drawing/2010/main" w="9525">
                   <a:solidFill>
                     <a:srgbClr val="000000"/>
                   </a:solidFill>
@@ -6529,7 +6380,7 @@
             </a:ln>
             <a:extLst>
               <a:ext uri="{91240B29-F687-4f45-9708-019B960494DF}">
-                <a14:hiddenLine xmlns:a14="http://schemas.microsoft.com/office/drawing/2010/main" xmlns="" w="9525">
+                <a14:hiddenLine xmlns="" xmlns:a14="http://schemas.microsoft.com/office/drawing/2010/main" w="9525">
                   <a:solidFill>
                     <a:srgbClr val="000000"/>
                   </a:solidFill>
@@ -6594,7 +6445,7 @@
             </a:ln>
             <a:extLst>
               <a:ext uri="{91240B29-F687-4f45-9708-019B960494DF}">
-                <a14:hiddenLine xmlns:a14="http://schemas.microsoft.com/office/drawing/2010/main" xmlns="" w="9525">
+                <a14:hiddenLine xmlns="" xmlns:a14="http://schemas.microsoft.com/office/drawing/2010/main" w="9525">
                   <a:solidFill>
                     <a:srgbClr val="000000"/>
                   </a:solidFill>
@@ -6684,7 +6535,7 @@
             </a:ln>
             <a:extLst>
               <a:ext uri="{91240B29-F687-4f45-9708-019B960494DF}">
-                <a14:hiddenLine xmlns:a14="http://schemas.microsoft.com/office/drawing/2010/main" xmlns="" w="9525">
+                <a14:hiddenLine xmlns="" xmlns:a14="http://schemas.microsoft.com/office/drawing/2010/main" w="9525">
                   <a:solidFill>
                     <a:srgbClr val="000000"/>
                   </a:solidFill>
@@ -6746,7 +6597,7 @@
             </a:ln>
             <a:extLst>
               <a:ext uri="{91240B29-F687-4f45-9708-019B960494DF}">
-                <a14:hiddenLine xmlns:a14="http://schemas.microsoft.com/office/drawing/2010/main" xmlns="" w="9525">
+                <a14:hiddenLine xmlns="" xmlns:a14="http://schemas.microsoft.com/office/drawing/2010/main" w="9525">
                   <a:solidFill>
                     <a:srgbClr val="000000"/>
                   </a:solidFill>
@@ -6836,7 +6687,7 @@
             </a:ln>
             <a:extLst>
               <a:ext uri="{91240B29-F687-4f45-9708-019B960494DF}">
-                <a14:hiddenLine xmlns:a14="http://schemas.microsoft.com/office/drawing/2010/main" xmlns="" w="9525">
+                <a14:hiddenLine xmlns="" xmlns:a14="http://schemas.microsoft.com/office/drawing/2010/main" w="9525">
                   <a:solidFill>
                     <a:srgbClr val="000000"/>
                   </a:solidFill>
@@ -6926,7 +6777,7 @@
             </a:ln>
             <a:extLst>
               <a:ext uri="{91240B29-F687-4f45-9708-019B960494DF}">
-                <a14:hiddenLine xmlns:a14="http://schemas.microsoft.com/office/drawing/2010/main" xmlns="" w="9525">
+                <a14:hiddenLine xmlns="" xmlns:a14="http://schemas.microsoft.com/office/drawing/2010/main" w="9525">
                   <a:solidFill>
                     <a:srgbClr val="000000"/>
                   </a:solidFill>
@@ -6991,7 +6842,7 @@
             </a:ln>
             <a:extLst>
               <a:ext uri="{91240B29-F687-4f45-9708-019B960494DF}">
-                <a14:hiddenLine xmlns:a14="http://schemas.microsoft.com/office/drawing/2010/main" xmlns="" w="9525">
+                <a14:hiddenLine xmlns="" xmlns:a14="http://schemas.microsoft.com/office/drawing/2010/main" w="9525">
                   <a:solidFill>
                     <a:srgbClr val="000000"/>
                   </a:solidFill>
@@ -7053,7 +6904,7 @@
             </a:ln>
             <a:extLst>
               <a:ext uri="{91240B29-F687-4f45-9708-019B960494DF}">
-                <a14:hiddenLine xmlns:a14="http://schemas.microsoft.com/office/drawing/2010/main" xmlns="" w="9525">
+                <a14:hiddenLine xmlns="" xmlns:a14="http://schemas.microsoft.com/office/drawing/2010/main" w="9525">
                   <a:solidFill>
                     <a:srgbClr val="000000"/>
                   </a:solidFill>
@@ -7143,7 +6994,7 @@
             </a:ln>
             <a:extLst>
               <a:ext uri="{91240B29-F687-4f45-9708-019B960494DF}">
-                <a14:hiddenLine xmlns:a14="http://schemas.microsoft.com/office/drawing/2010/main" xmlns="" w="9525">
+                <a14:hiddenLine xmlns="" xmlns:a14="http://schemas.microsoft.com/office/drawing/2010/main" w="9525">
                   <a:solidFill>
                     <a:srgbClr val="000000"/>
                   </a:solidFill>
@@ -7233,7 +7084,7 @@
             </a:ln>
             <a:extLst>
               <a:ext uri="{91240B29-F687-4f45-9708-019B960494DF}">
-                <a14:hiddenLine xmlns:a14="http://schemas.microsoft.com/office/drawing/2010/main" xmlns="" w="9525">
+                <a14:hiddenLine xmlns="" xmlns:a14="http://schemas.microsoft.com/office/drawing/2010/main" w="9525">
                   <a:solidFill>
                     <a:srgbClr val="000000"/>
                   </a:solidFill>
@@ -7295,7 +7146,7 @@
             </a:ln>
             <a:extLst>
               <a:ext uri="{91240B29-F687-4f45-9708-019B960494DF}">
-                <a14:hiddenLine xmlns:a14="http://schemas.microsoft.com/office/drawing/2010/main" xmlns="" w="9525">
+                <a14:hiddenLine xmlns="" xmlns:a14="http://schemas.microsoft.com/office/drawing/2010/main" w="9525">
                   <a:solidFill>
                     <a:srgbClr val="000000"/>
                   </a:solidFill>
@@ -7415,7 +7266,7 @@
             </a:ln>
             <a:extLst>
               <a:ext uri="{91240B29-F687-4f45-9708-019B960494DF}">
-                <a14:hiddenLine xmlns:a14="http://schemas.microsoft.com/office/drawing/2010/main" xmlns="" w="9525">
+                <a14:hiddenLine xmlns="" xmlns:a14="http://schemas.microsoft.com/office/drawing/2010/main" w="9525">
                   <a:solidFill>
                     <a:srgbClr val="000000"/>
                   </a:solidFill>
@@ -7483,7 +7334,7 @@
             </a:ln>
             <a:extLst>
               <a:ext uri="{91240B29-F687-4f45-9708-019B960494DF}">
-                <a14:hiddenLine xmlns:a14="http://schemas.microsoft.com/office/drawing/2010/main" xmlns="" w="9525">
+                <a14:hiddenLine xmlns="" xmlns:a14="http://schemas.microsoft.com/office/drawing/2010/main" w="9525">
                   <a:solidFill>
                     <a:srgbClr val="000000"/>
                   </a:solidFill>
@@ -7573,7 +7424,7 @@
             </a:ln>
             <a:extLst>
               <a:ext uri="{91240B29-F687-4f45-9708-019B960494DF}">
-                <a14:hiddenLine xmlns:a14="http://schemas.microsoft.com/office/drawing/2010/main" xmlns="" w="9525">
+                <a14:hiddenLine xmlns="" xmlns:a14="http://schemas.microsoft.com/office/drawing/2010/main" w="9525">
                   <a:solidFill>
                     <a:srgbClr val="000000"/>
                   </a:solidFill>
@@ -7713,7 +7564,7 @@
           <a:p>
             <a:fld id="{23A2EE42-8222-486F-A514-5A23D68216E1}" type="datetimeFigureOut">
               <a:rPr lang="tr-TR" smtClean="0"/>
-              <a:t>4.04.2025</a:t>
+              <a:t>11.04.2025</a:t>
             </a:fld>
             <a:endParaRPr lang="tr-TR" dirty="0"/>
           </a:p>
@@ -7980,7 +7831,7 @@
           <a:p>
             <a:fld id="{23A2EE42-8222-486F-A514-5A23D68216E1}" type="datetimeFigureOut">
               <a:rPr lang="tr-TR" smtClean="0"/>
-              <a:t>4.04.2025</a:t>
+              <a:t>11.04.2025</a:t>
             </a:fld>
             <a:endParaRPr lang="tr-TR" dirty="0"/>
           </a:p>
@@ -8176,7 +8027,7 @@
           <a:p>
             <a:fld id="{23A2EE42-8222-486F-A514-5A23D68216E1}" type="datetimeFigureOut">
               <a:rPr lang="tr-TR" smtClean="0"/>
-              <a:t>4.04.2025</a:t>
+              <a:t>11.04.2025</a:t>
             </a:fld>
             <a:endParaRPr lang="tr-TR" dirty="0"/>
           </a:p>
@@ -8439,7 +8290,7 @@
           <a:p>
             <a:fld id="{23A2EE42-8222-486F-A514-5A23D68216E1}" type="datetimeFigureOut">
               <a:rPr lang="tr-TR" smtClean="0"/>
-              <a:t>4.04.2025</a:t>
+              <a:t>11.04.2025</a:t>
             </a:fld>
             <a:endParaRPr lang="tr-TR" dirty="0"/>
           </a:p>
@@ -8873,7 +8724,7 @@
           <a:p>
             <a:fld id="{23A2EE42-8222-486F-A514-5A23D68216E1}" type="datetimeFigureOut">
               <a:rPr lang="tr-TR" smtClean="0"/>
-              <a:t>4.04.2025</a:t>
+              <a:t>11.04.2025</a:t>
             </a:fld>
             <a:endParaRPr lang="tr-TR" dirty="0"/>
           </a:p>
@@ -9419,7 +9270,7 @@
           <a:p>
             <a:fld id="{23A2EE42-8222-486F-A514-5A23D68216E1}" type="datetimeFigureOut">
               <a:rPr lang="tr-TR" smtClean="0"/>
-              <a:t>4.04.2025</a:t>
+              <a:t>11.04.2025</a:t>
             </a:fld>
             <a:endParaRPr lang="tr-TR" dirty="0"/>
           </a:p>
@@ -10139,7 +9990,7 @@
           <a:p>
             <a:fld id="{23A2EE42-8222-486F-A514-5A23D68216E1}" type="datetimeFigureOut">
               <a:rPr lang="tr-TR" smtClean="0"/>
-              <a:t>4.04.2025</a:t>
+              <a:t>11.04.2025</a:t>
             </a:fld>
             <a:endParaRPr lang="tr-TR" dirty="0"/>
           </a:p>
@@ -10309,7 +10160,7 @@
           <a:p>
             <a:fld id="{23A2EE42-8222-486F-A514-5A23D68216E1}" type="datetimeFigureOut">
               <a:rPr lang="tr-TR" smtClean="0"/>
-              <a:t>4.04.2025</a:t>
+              <a:t>11.04.2025</a:t>
             </a:fld>
             <a:endParaRPr lang="tr-TR" dirty="0"/>
           </a:p>
@@ -10489,7 +10340,7 @@
           <a:p>
             <a:fld id="{23A2EE42-8222-486F-A514-5A23D68216E1}" type="datetimeFigureOut">
               <a:rPr lang="tr-TR" smtClean="0"/>
-              <a:t>4.04.2025</a:t>
+              <a:t>11.04.2025</a:t>
             </a:fld>
             <a:endParaRPr lang="tr-TR" dirty="0"/>
           </a:p>
@@ -10659,7 +10510,7 @@
           <a:p>
             <a:fld id="{23A2EE42-8222-486F-A514-5A23D68216E1}" type="datetimeFigureOut">
               <a:rPr lang="tr-TR" smtClean="0"/>
-              <a:t>4.04.2025</a:t>
+              <a:t>11.04.2025</a:t>
             </a:fld>
             <a:endParaRPr lang="tr-TR" dirty="0"/>
           </a:p>
@@ -10909,7 +10760,7 @@
           <a:p>
             <a:fld id="{23A2EE42-8222-486F-A514-5A23D68216E1}" type="datetimeFigureOut">
               <a:rPr lang="tr-TR" smtClean="0"/>
-              <a:t>4.04.2025</a:t>
+              <a:t>11.04.2025</a:t>
             </a:fld>
             <a:endParaRPr lang="tr-TR" dirty="0"/>
           </a:p>
@@ -11141,7 +10992,7 @@
           <a:p>
             <a:fld id="{23A2EE42-8222-486F-A514-5A23D68216E1}" type="datetimeFigureOut">
               <a:rPr lang="tr-TR" smtClean="0"/>
-              <a:t>4.04.2025</a:t>
+              <a:t>11.04.2025</a:t>
             </a:fld>
             <a:endParaRPr lang="tr-TR" dirty="0"/>
           </a:p>
@@ -11522,7 +11373,7 @@
           <a:p>
             <a:fld id="{23A2EE42-8222-486F-A514-5A23D68216E1}" type="datetimeFigureOut">
               <a:rPr lang="tr-TR" smtClean="0"/>
-              <a:t>4.04.2025</a:t>
+              <a:t>11.04.2025</a:t>
             </a:fld>
             <a:endParaRPr lang="tr-TR" dirty="0"/>
           </a:p>
@@ -11640,7 +11491,7 @@
           <a:p>
             <a:fld id="{23A2EE42-8222-486F-A514-5A23D68216E1}" type="datetimeFigureOut">
               <a:rPr lang="tr-TR" smtClean="0"/>
-              <a:t>4.04.2025</a:t>
+              <a:t>11.04.2025</a:t>
             </a:fld>
             <a:endParaRPr lang="tr-TR" dirty="0"/>
           </a:p>
@@ -11735,7 +11586,7 @@
           <a:p>
             <a:fld id="{23A2EE42-8222-486F-A514-5A23D68216E1}" type="datetimeFigureOut">
               <a:rPr lang="tr-TR" smtClean="0"/>
-              <a:t>4.04.2025</a:t>
+              <a:t>11.04.2025</a:t>
             </a:fld>
             <a:endParaRPr lang="tr-TR" dirty="0"/>
           </a:p>
@@ -11984,7 +11835,7 @@
           <a:p>
             <a:fld id="{23A2EE42-8222-486F-A514-5A23D68216E1}" type="datetimeFigureOut">
               <a:rPr lang="tr-TR" smtClean="0"/>
-              <a:t>4.04.2025</a:t>
+              <a:t>11.04.2025</a:t>
             </a:fld>
             <a:endParaRPr lang="tr-TR" dirty="0"/>
           </a:p>
@@ -12264,7 +12115,7 @@
           <a:p>
             <a:fld id="{23A2EE42-8222-486F-A514-5A23D68216E1}" type="datetimeFigureOut">
               <a:rPr lang="tr-TR" smtClean="0"/>
-              <a:t>4.04.2025</a:t>
+              <a:t>11.04.2025</a:t>
             </a:fld>
             <a:endParaRPr lang="tr-TR" dirty="0"/>
           </a:p>
@@ -12387,7 +12238,7 @@
           <a:noFill/>
           <a:extLst>
             <a:ext uri="{909E8E84-426E-40dd-AFC4-6F175D3DCCD1}">
-              <a14:hiddenFill xmlns:a14="http://schemas.microsoft.com/office/drawing/2010/main" xmlns="">
+              <a14:hiddenFill xmlns="" xmlns:a14="http://schemas.microsoft.com/office/drawing/2010/main">
                 <a:solidFill>
                   <a:srgbClr val="FFFFFF"/>
                 </a:solidFill>
@@ -12461,7 +12312,7 @@
               </a:ln>
               <a:extLst>
                 <a:ext uri="{91240B29-F687-4f45-9708-019B960494DF}">
-                  <a14:hiddenLine xmlns:a14="http://schemas.microsoft.com/office/drawing/2010/main" xmlns="" w="9525">
+                  <a14:hiddenLine xmlns="" xmlns:a14="http://schemas.microsoft.com/office/drawing/2010/main" w="9525">
                     <a:solidFill>
                       <a:srgbClr val="000000"/>
                     </a:solidFill>
@@ -12551,7 +12402,7 @@
               </a:ln>
               <a:extLst>
                 <a:ext uri="{91240B29-F687-4f45-9708-019B960494DF}">
-                  <a14:hiddenLine xmlns:a14="http://schemas.microsoft.com/office/drawing/2010/main" xmlns="" w="9525">
+                  <a14:hiddenLine xmlns="" xmlns:a14="http://schemas.microsoft.com/office/drawing/2010/main" w="9525">
                     <a:solidFill>
                       <a:srgbClr val="000000"/>
                     </a:solidFill>
@@ -12641,7 +12492,7 @@
               </a:ln>
               <a:extLst>
                 <a:ext uri="{91240B29-F687-4f45-9708-019B960494DF}">
-                  <a14:hiddenLine xmlns:a14="http://schemas.microsoft.com/office/drawing/2010/main" xmlns="" w="9525">
+                  <a14:hiddenLine xmlns="" xmlns:a14="http://schemas.microsoft.com/office/drawing/2010/main" w="9525">
                     <a:solidFill>
                       <a:srgbClr val="000000"/>
                     </a:solidFill>
@@ -12703,7 +12554,7 @@
               </a:ln>
               <a:extLst>
                 <a:ext uri="{91240B29-F687-4f45-9708-019B960494DF}">
-                  <a14:hiddenLine xmlns:a14="http://schemas.microsoft.com/office/drawing/2010/main" xmlns="" w="9525">
+                  <a14:hiddenLine xmlns="" xmlns:a14="http://schemas.microsoft.com/office/drawing/2010/main" w="9525">
                     <a:solidFill>
                       <a:srgbClr val="000000"/>
                     </a:solidFill>
@@ -12793,7 +12644,7 @@
               </a:ln>
               <a:extLst>
                 <a:ext uri="{91240B29-F687-4f45-9708-019B960494DF}">
-                  <a14:hiddenLine xmlns:a14="http://schemas.microsoft.com/office/drawing/2010/main" xmlns="" w="9525">
+                  <a14:hiddenLine xmlns="" xmlns:a14="http://schemas.microsoft.com/office/drawing/2010/main" w="9525">
                     <a:solidFill>
                       <a:srgbClr val="000000"/>
                     </a:solidFill>
@@ -12855,7 +12706,7 @@
               </a:ln>
               <a:extLst>
                 <a:ext uri="{91240B29-F687-4f45-9708-019B960494DF}">
-                  <a14:hiddenLine xmlns:a14="http://schemas.microsoft.com/office/drawing/2010/main" xmlns="" w="9525">
+                  <a14:hiddenLine xmlns="" xmlns:a14="http://schemas.microsoft.com/office/drawing/2010/main" w="9525">
                     <a:solidFill>
                       <a:srgbClr val="000000"/>
                     </a:solidFill>
@@ -12917,7 +12768,7 @@
               </a:ln>
               <a:extLst>
                 <a:ext uri="{91240B29-F687-4f45-9708-019B960494DF}">
-                  <a14:hiddenLine xmlns:a14="http://schemas.microsoft.com/office/drawing/2010/main" xmlns="" w="9525">
+                  <a14:hiddenLine xmlns="" xmlns:a14="http://schemas.microsoft.com/office/drawing/2010/main" w="9525">
                     <a:solidFill>
                       <a:srgbClr val="000000"/>
                     </a:solidFill>
@@ -13007,7 +12858,7 @@
               </a:ln>
               <a:extLst>
                 <a:ext uri="{91240B29-F687-4f45-9708-019B960494DF}">
-                  <a14:hiddenLine xmlns:a14="http://schemas.microsoft.com/office/drawing/2010/main" xmlns="" w="9525">
+                  <a14:hiddenLine xmlns="" xmlns:a14="http://schemas.microsoft.com/office/drawing/2010/main" w="9525">
                     <a:solidFill>
                       <a:srgbClr val="000000"/>
                     </a:solidFill>
@@ -13097,7 +12948,7 @@
               </a:ln>
               <a:extLst>
                 <a:ext uri="{91240B29-F687-4f45-9708-019B960494DF}">
-                  <a14:hiddenLine xmlns:a14="http://schemas.microsoft.com/office/drawing/2010/main" xmlns="" w="9525">
+                  <a14:hiddenLine xmlns="" xmlns:a14="http://schemas.microsoft.com/office/drawing/2010/main" w="9525">
                     <a:solidFill>
                       <a:srgbClr val="000000"/>
                     </a:solidFill>
@@ -13159,7 +13010,7 @@
               </a:ln>
               <a:extLst>
                 <a:ext uri="{91240B29-F687-4f45-9708-019B960494DF}">
-                  <a14:hiddenLine xmlns:a14="http://schemas.microsoft.com/office/drawing/2010/main" xmlns="" w="9525">
+                  <a14:hiddenLine xmlns="" xmlns:a14="http://schemas.microsoft.com/office/drawing/2010/main" w="9525">
                     <a:solidFill>
                       <a:srgbClr val="000000"/>
                     </a:solidFill>
@@ -13269,7 +13120,7 @@
               </a:ln>
               <a:extLst>
                 <a:ext uri="{91240B29-F687-4f45-9708-019B960494DF}">
-                  <a14:hiddenLine xmlns:a14="http://schemas.microsoft.com/office/drawing/2010/main" xmlns="" w="9525">
+                  <a14:hiddenLine xmlns="" xmlns:a14="http://schemas.microsoft.com/office/drawing/2010/main" w="9525">
                     <a:solidFill>
                       <a:srgbClr val="000000"/>
                     </a:solidFill>
@@ -13353,7 +13204,7 @@
               </a:ln>
               <a:extLst>
                 <a:ext uri="{91240B29-F687-4f45-9708-019B960494DF}">
-                  <a14:hiddenLine xmlns:a14="http://schemas.microsoft.com/office/drawing/2010/main" xmlns="" w="9525">
+                  <a14:hiddenLine xmlns="" xmlns:a14="http://schemas.microsoft.com/office/drawing/2010/main" w="9525">
                     <a:solidFill>
                       <a:srgbClr val="000000"/>
                     </a:solidFill>
@@ -13415,7 +13266,7 @@
               </a:ln>
               <a:extLst>
                 <a:ext uri="{91240B29-F687-4f45-9708-019B960494DF}">
-                  <a14:hiddenLine xmlns:a14="http://schemas.microsoft.com/office/drawing/2010/main" xmlns="" w="9525">
+                  <a14:hiddenLine xmlns="" xmlns:a14="http://schemas.microsoft.com/office/drawing/2010/main" w="9525">
                     <a:solidFill>
                       <a:srgbClr val="000000"/>
                     </a:solidFill>
@@ -13477,7 +13328,7 @@
               </a:ln>
               <a:extLst>
                 <a:ext uri="{91240B29-F687-4f45-9708-019B960494DF}">
-                  <a14:hiddenLine xmlns:a14="http://schemas.microsoft.com/office/drawing/2010/main" xmlns="" w="9525">
+                  <a14:hiddenLine xmlns="" xmlns:a14="http://schemas.microsoft.com/office/drawing/2010/main" w="9525">
                     <a:solidFill>
                       <a:srgbClr val="000000"/>
                     </a:solidFill>
@@ -13567,7 +13418,7 @@
               </a:ln>
               <a:extLst>
                 <a:ext uri="{91240B29-F687-4f45-9708-019B960494DF}">
-                  <a14:hiddenLine xmlns:a14="http://schemas.microsoft.com/office/drawing/2010/main" xmlns="" w="9525">
+                  <a14:hiddenLine xmlns="" xmlns:a14="http://schemas.microsoft.com/office/drawing/2010/main" w="9525">
                     <a:solidFill>
                       <a:srgbClr val="000000"/>
                     </a:solidFill>
@@ -13601,7 +13452,7 @@
               </a:ln>
               <a:extLst>
                 <a:ext uri="{91240B29-F687-4f45-9708-019B960494DF}">
-                  <a14:hiddenLine xmlns:a14="http://schemas.microsoft.com/office/drawing/2010/main" xmlns="" w="9525">
+                  <a14:hiddenLine xmlns="" xmlns:a14="http://schemas.microsoft.com/office/drawing/2010/main" w="9525">
                     <a:solidFill>
                       <a:srgbClr val="000000"/>
                     </a:solidFill>
@@ -13666,7 +13517,7 @@
               </a:ln>
               <a:extLst>
                 <a:ext uri="{91240B29-F687-4f45-9708-019B960494DF}">
-                  <a14:hiddenLine xmlns:a14="http://schemas.microsoft.com/office/drawing/2010/main" xmlns="" w="9525">
+                  <a14:hiddenLine xmlns="" xmlns:a14="http://schemas.microsoft.com/office/drawing/2010/main" w="9525">
                     <a:solidFill>
                       <a:srgbClr val="000000"/>
                     </a:solidFill>
@@ -13756,7 +13607,7 @@
               </a:ln>
               <a:extLst>
                 <a:ext uri="{91240B29-F687-4f45-9708-019B960494DF}">
-                  <a14:hiddenLine xmlns:a14="http://schemas.microsoft.com/office/drawing/2010/main" xmlns="" w="9525">
+                  <a14:hiddenLine xmlns="" xmlns:a14="http://schemas.microsoft.com/office/drawing/2010/main" w="9525">
                     <a:solidFill>
                       <a:srgbClr val="000000"/>
                     </a:solidFill>
@@ -13818,7 +13669,7 @@
               </a:ln>
               <a:extLst>
                 <a:ext uri="{91240B29-F687-4f45-9708-019B960494DF}">
-                  <a14:hiddenLine xmlns:a14="http://schemas.microsoft.com/office/drawing/2010/main" xmlns="" w="9525">
+                  <a14:hiddenLine xmlns="" xmlns:a14="http://schemas.microsoft.com/office/drawing/2010/main" w="9525">
                     <a:solidFill>
                       <a:srgbClr val="000000"/>
                     </a:solidFill>
@@ -13908,7 +13759,7 @@
               </a:ln>
               <a:extLst>
                 <a:ext uri="{91240B29-F687-4f45-9708-019B960494DF}">
-                  <a14:hiddenLine xmlns:a14="http://schemas.microsoft.com/office/drawing/2010/main" xmlns="" w="9525">
+                  <a14:hiddenLine xmlns="" xmlns:a14="http://schemas.microsoft.com/office/drawing/2010/main" w="9525">
                     <a:solidFill>
                       <a:srgbClr val="000000"/>
                     </a:solidFill>
@@ -13973,7 +13824,7 @@
               </a:ln>
               <a:extLst>
                 <a:ext uri="{91240B29-F687-4f45-9708-019B960494DF}">
-                  <a14:hiddenLine xmlns:a14="http://schemas.microsoft.com/office/drawing/2010/main" xmlns="" w="9525">
+                  <a14:hiddenLine xmlns="" xmlns:a14="http://schemas.microsoft.com/office/drawing/2010/main" w="9525">
                     <a:solidFill>
                       <a:srgbClr val="000000"/>
                     </a:solidFill>
@@ -14035,7 +13886,7 @@
               </a:ln>
               <a:extLst>
                 <a:ext uri="{91240B29-F687-4f45-9708-019B960494DF}">
-                  <a14:hiddenLine xmlns:a14="http://schemas.microsoft.com/office/drawing/2010/main" xmlns="" w="9525">
+                  <a14:hiddenLine xmlns="" xmlns:a14="http://schemas.microsoft.com/office/drawing/2010/main" w="9525">
                     <a:solidFill>
                       <a:srgbClr val="000000"/>
                     </a:solidFill>
@@ -14125,7 +13976,7 @@
               </a:ln>
               <a:extLst>
                 <a:ext uri="{91240B29-F687-4f45-9708-019B960494DF}">
-                  <a14:hiddenLine xmlns:a14="http://schemas.microsoft.com/office/drawing/2010/main" xmlns="" w="9525">
+                  <a14:hiddenLine xmlns="" xmlns:a14="http://schemas.microsoft.com/office/drawing/2010/main" w="9525">
                     <a:solidFill>
                       <a:srgbClr val="000000"/>
                     </a:solidFill>
@@ -14215,7 +14066,7 @@
               </a:ln>
               <a:extLst>
                 <a:ext uri="{91240B29-F687-4f45-9708-019B960494DF}">
-                  <a14:hiddenLine xmlns:a14="http://schemas.microsoft.com/office/drawing/2010/main" xmlns="" w="9525">
+                  <a14:hiddenLine xmlns="" xmlns:a14="http://schemas.microsoft.com/office/drawing/2010/main" w="9525">
                     <a:solidFill>
                       <a:srgbClr val="000000"/>
                     </a:solidFill>
@@ -14280,7 +14131,7 @@
               </a:ln>
               <a:extLst>
                 <a:ext uri="{91240B29-F687-4f45-9708-019B960494DF}">
-                  <a14:hiddenLine xmlns:a14="http://schemas.microsoft.com/office/drawing/2010/main" xmlns="" w="9525">
+                  <a14:hiddenLine xmlns="" xmlns:a14="http://schemas.microsoft.com/office/drawing/2010/main" w="9525">
                     <a:solidFill>
                       <a:srgbClr val="000000"/>
                     </a:solidFill>
@@ -14400,7 +14251,7 @@
               </a:ln>
               <a:extLst>
                 <a:ext uri="{91240B29-F687-4f45-9708-019B960494DF}">
-                  <a14:hiddenLine xmlns:a14="http://schemas.microsoft.com/office/drawing/2010/main" xmlns="" w="9525">
+                  <a14:hiddenLine xmlns="" xmlns:a14="http://schemas.microsoft.com/office/drawing/2010/main" w="9525">
                     <a:solidFill>
                       <a:srgbClr val="000000"/>
                     </a:solidFill>
@@ -14481,7 +14332,7 @@
               </a:ln>
               <a:extLst>
                 <a:ext uri="{91240B29-F687-4f45-9708-019B960494DF}">
-                  <a14:hiddenLine xmlns:a14="http://schemas.microsoft.com/office/drawing/2010/main" xmlns="" w="9525">
+                  <a14:hiddenLine xmlns="" xmlns:a14="http://schemas.microsoft.com/office/drawing/2010/main" w="9525">
                     <a:solidFill>
                       <a:srgbClr val="000000"/>
                     </a:solidFill>
@@ -14596,7 +14447,7 @@
               </a:ln>
               <a:extLst>
                 <a:ext uri="{91240B29-F687-4f45-9708-019B960494DF}">
-                  <a14:hiddenLine xmlns:a14="http://schemas.microsoft.com/office/drawing/2010/main" xmlns="" w="9525">
+                  <a14:hiddenLine xmlns="" xmlns:a14="http://schemas.microsoft.com/office/drawing/2010/main" w="9525">
                     <a:solidFill>
                       <a:srgbClr val="000000"/>
                     </a:solidFill>
@@ -14686,7 +14537,7 @@
               </a:ln>
               <a:extLst>
                 <a:ext uri="{91240B29-F687-4f45-9708-019B960494DF}">
-                  <a14:hiddenLine xmlns:a14="http://schemas.microsoft.com/office/drawing/2010/main" xmlns="" w="9525">
+                  <a14:hiddenLine xmlns="" xmlns:a14="http://schemas.microsoft.com/office/drawing/2010/main" w="9525">
                     <a:solidFill>
                       <a:srgbClr val="000000"/>
                     </a:solidFill>
@@ -14751,7 +14602,7 @@
               </a:ln>
               <a:extLst>
                 <a:ext uri="{91240B29-F687-4f45-9708-019B960494DF}">
-                  <a14:hiddenLine xmlns:a14="http://schemas.microsoft.com/office/drawing/2010/main" xmlns="" w="9525">
+                  <a14:hiddenLine xmlns="" xmlns:a14="http://schemas.microsoft.com/office/drawing/2010/main" w="9525">
                     <a:solidFill>
                       <a:srgbClr val="000000"/>
                     </a:solidFill>
@@ -14841,7 +14692,7 @@
               </a:ln>
               <a:extLst>
                 <a:ext uri="{91240B29-F687-4f45-9708-019B960494DF}">
-                  <a14:hiddenLine xmlns:a14="http://schemas.microsoft.com/office/drawing/2010/main" xmlns="" w="9525">
+                  <a14:hiddenLine xmlns="" xmlns:a14="http://schemas.microsoft.com/office/drawing/2010/main" w="9525">
                     <a:solidFill>
                       <a:srgbClr val="000000"/>
                     </a:solidFill>
@@ -14909,7 +14760,7 @@
               </a:ln>
               <a:extLst>
                 <a:ext uri="{91240B29-F687-4f45-9708-019B960494DF}">
-                  <a14:hiddenLine xmlns:a14="http://schemas.microsoft.com/office/drawing/2010/main" xmlns="" w="9525">
+                  <a14:hiddenLine xmlns="" xmlns:a14="http://schemas.microsoft.com/office/drawing/2010/main" w="9525">
                     <a:solidFill>
                       <a:srgbClr val="000000"/>
                     </a:solidFill>
@@ -14999,7 +14850,7 @@
               </a:ln>
               <a:extLst>
                 <a:ext uri="{91240B29-F687-4f45-9708-019B960494DF}">
-                  <a14:hiddenLine xmlns:a14="http://schemas.microsoft.com/office/drawing/2010/main" xmlns="" w="9525">
+                  <a14:hiddenLine xmlns="" xmlns:a14="http://schemas.microsoft.com/office/drawing/2010/main" w="9525">
                     <a:solidFill>
                       <a:srgbClr val="000000"/>
                     </a:solidFill>
@@ -15067,7 +14918,7 @@
               </a:ln>
               <a:extLst>
                 <a:ext uri="{91240B29-F687-4f45-9708-019B960494DF}">
-                  <a14:hiddenLine xmlns:a14="http://schemas.microsoft.com/office/drawing/2010/main" xmlns="" w="9525">
+                  <a14:hiddenLine xmlns="" xmlns:a14="http://schemas.microsoft.com/office/drawing/2010/main" w="9525">
                     <a:solidFill>
                       <a:srgbClr val="000000"/>
                     </a:solidFill>
@@ -15157,7 +15008,7 @@
               </a:ln>
               <a:extLst>
                 <a:ext uri="{91240B29-F687-4f45-9708-019B960494DF}">
-                  <a14:hiddenLine xmlns:a14="http://schemas.microsoft.com/office/drawing/2010/main" xmlns="" w="9525">
+                  <a14:hiddenLine xmlns="" xmlns:a14="http://schemas.microsoft.com/office/drawing/2010/main" w="9525">
                     <a:solidFill>
                       <a:srgbClr val="000000"/>
                     </a:solidFill>
@@ -15191,7 +15042,7 @@
               </a:ln>
               <a:extLst>
                 <a:ext uri="{91240B29-F687-4f45-9708-019B960494DF}">
-                  <a14:hiddenLine xmlns:a14="http://schemas.microsoft.com/office/drawing/2010/main" xmlns="" w="9525">
+                  <a14:hiddenLine xmlns="" xmlns:a14="http://schemas.microsoft.com/office/drawing/2010/main" w="9525">
                     <a:solidFill>
                       <a:srgbClr val="000000"/>
                     </a:solidFill>
@@ -15331,7 +15182,7 @@
           <a:p>
             <a:fld id="{23A2EE42-8222-486F-A514-5A23D68216E1}" type="datetimeFigureOut">
               <a:rPr lang="tr-TR" smtClean="0"/>
-              <a:t>4.04.2025</a:t>
+              <a:t>11.04.2025</a:t>
             </a:fld>
             <a:endParaRPr lang="tr-TR" dirty="0"/>
           </a:p>
@@ -16275,7 +16126,7 @@
           <p:nvPr>
             <p:extLst>
               <p:ext uri="{D42A27DB-BD31-4B8C-83A1-F6EECF244321}">
-                <p14:modId xmlns:p14="http://schemas.microsoft.com/office/powerpoint/2010/main" val="2816103790"/>
+                <p14:modId xmlns:p14="http://schemas.microsoft.com/office/powerpoint/2010/main" val="1264052106"/>
               </p:ext>
             </p:extLst>
           </p:nvPr>
@@ -16365,103 +16216,6 @@
                 <a:schemeClr val="accent1"/>
               </a:solidFill>
             </a:endParaRPr>
-          </a:p>
-        </p:txBody>
-      </p:sp>
-      <p:sp>
-        <p:nvSpPr>
-          <p:cNvPr id="7" name="Metin kutusu 6"/>
-          <p:cNvSpPr txBox="1"/>
-          <p:nvPr/>
-        </p:nvSpPr>
-        <p:spPr>
-          <a:xfrm>
-            <a:off x="6262253" y="988471"/>
-            <a:ext cx="3897747" cy="369332"/>
-          </a:xfrm>
-          <a:prstGeom prst="rect">
-            <a:avLst/>
-          </a:prstGeom>
-          <a:noFill/>
-        </p:spPr>
-        <p:txBody>
-          <a:bodyPr wrap="square" rtlCol="0">
-            <a:spAutoFit/>
-          </a:bodyPr>
-          <a:lstStyle/>
-          <a:p>
-            <a:r>
-              <a:rPr lang="tr-TR" dirty="0">
-                <a:solidFill>
-                  <a:schemeClr val="accent2"/>
-                </a:solidFill>
-              </a:rPr>
-              <a:t>#pragma </a:t>
-            </a:r>
-            <a:r>
-              <a:rPr lang="tr-TR" dirty="0" err="1">
-                <a:solidFill>
-                  <a:schemeClr val="accent2"/>
-                </a:solidFill>
-              </a:rPr>
-              <a:t>omp</a:t>
-            </a:r>
-            <a:r>
-              <a:rPr lang="tr-TR" dirty="0">
-                <a:solidFill>
-                  <a:schemeClr val="accent2"/>
-                </a:solidFill>
-              </a:rPr>
-              <a:t> </a:t>
-            </a:r>
-            <a:r>
-              <a:rPr lang="tr-TR" dirty="0" err="1" smtClean="0">
-                <a:solidFill>
-                  <a:schemeClr val="accent2"/>
-                </a:solidFill>
-              </a:rPr>
-              <a:t>parallel</a:t>
-            </a:r>
-            <a:r>
-              <a:rPr lang="tr-TR" dirty="0" smtClean="0">
-                <a:solidFill>
-                  <a:schemeClr val="accent2"/>
-                </a:solidFill>
-              </a:rPr>
-              <a:t> </a:t>
-            </a:r>
-            <a:r>
-              <a:rPr lang="tr-TR" dirty="0" err="1">
-                <a:solidFill>
-                  <a:schemeClr val="accent2"/>
-                </a:solidFill>
-              </a:rPr>
-              <a:t>for</a:t>
-            </a:r>
-            <a:r>
-              <a:rPr lang="tr-TR" dirty="0">
-                <a:solidFill>
-                  <a:schemeClr val="accent2"/>
-                </a:solidFill>
-              </a:rPr>
-              <a:t> </a:t>
-            </a:r>
-            <a:r>
-              <a:rPr lang="tr-TR" dirty="0" err="1">
-                <a:solidFill>
-                  <a:schemeClr val="accent2"/>
-                </a:solidFill>
-              </a:rPr>
-              <a:t>collapse</a:t>
-            </a:r>
-            <a:r>
-              <a:rPr lang="tr-TR" dirty="0">
-                <a:solidFill>
-                  <a:schemeClr val="accent2"/>
-                </a:solidFill>
-              </a:rPr>
-              <a:t>(2)</a:t>
-            </a:r>
           </a:p>
         </p:txBody>
       </p:sp>

</xml_diff>